<commit_message>
Agregar documentación y créditos en los scripts SQL, cuaderno Jupyter y archivo README, incluyendo los nombres de los integrantes del estudio sobre el comportamiento criminal en Los Ángeles.
</commit_message>
<xml_diff>
--- a/ESTUDIO SOBRE EL COMPORTAMIENTO CRIMINAL EN LA CIUDAD DE LOS ÁNGELES - CALIFORNIA DESDE 2020 HASTA 2024.pptx
+++ b/ESTUDIO SOBRE EL COMPORTAMIENTO CRIMINAL EN LA CIUDAD DE LOS ÁNGELES - CALIFORNIA DESDE 2020 HASTA 2024.pptx
@@ -216,7 +216,7 @@
           <a:p>
             <a:fld id="{97EC9CCD-392A-4BF8-8501-ECB833FF8945}" type="datetimeFigureOut">
               <a:rPr lang="es-CO" smtClean="0"/>
-              <a:t>21/10/2025</a:t>
+              <a:t>30/10/2025</a:t>
             </a:fld>
             <a:endParaRPr lang="es-CO"/>
           </a:p>
@@ -1176,7 +1176,7 @@
           <a:p>
             <a:fld id="{089BA713-8062-4EF7-8820-87EE93BC6374}" type="datetimeFigureOut">
               <a:rPr lang="es-CO" smtClean="0"/>
-              <a:t>21/10/2025</a:t>
+              <a:t>30/10/2025</a:t>
             </a:fld>
             <a:endParaRPr lang="es-CO"/>
           </a:p>
@@ -1387,7 +1387,7 @@
           <a:p>
             <a:fld id="{089BA713-8062-4EF7-8820-87EE93BC6374}" type="datetimeFigureOut">
               <a:rPr lang="es-CO" smtClean="0"/>
-              <a:t>21/10/2025</a:t>
+              <a:t>30/10/2025</a:t>
             </a:fld>
             <a:endParaRPr lang="es-CO"/>
           </a:p>
@@ -1602,7 +1602,7 @@
           <a:p>
             <a:fld id="{089BA713-8062-4EF7-8820-87EE93BC6374}" type="datetimeFigureOut">
               <a:rPr lang="es-CO" smtClean="0"/>
-              <a:t>21/10/2025</a:t>
+              <a:t>30/10/2025</a:t>
             </a:fld>
             <a:endParaRPr lang="es-CO"/>
           </a:p>
@@ -1803,7 +1803,7 @@
           <a:p>
             <a:fld id="{089BA713-8062-4EF7-8820-87EE93BC6374}" type="datetimeFigureOut">
               <a:rPr lang="es-CO" smtClean="0"/>
-              <a:t>21/10/2025</a:t>
+              <a:t>30/10/2025</a:t>
             </a:fld>
             <a:endParaRPr lang="es-CO"/>
           </a:p>
@@ -2082,7 +2082,7 @@
           <a:p>
             <a:fld id="{089BA713-8062-4EF7-8820-87EE93BC6374}" type="datetimeFigureOut">
               <a:rPr lang="es-CO" smtClean="0"/>
-              <a:t>21/10/2025</a:t>
+              <a:t>30/10/2025</a:t>
             </a:fld>
             <a:endParaRPr lang="es-CO"/>
           </a:p>
@@ -2350,7 +2350,7 @@
           <a:p>
             <a:fld id="{089BA713-8062-4EF7-8820-87EE93BC6374}" type="datetimeFigureOut">
               <a:rPr lang="es-CO" smtClean="0"/>
-              <a:t>21/10/2025</a:t>
+              <a:t>30/10/2025</a:t>
             </a:fld>
             <a:endParaRPr lang="es-CO"/>
           </a:p>
@@ -2766,7 +2766,7 @@
           <a:p>
             <a:fld id="{089BA713-8062-4EF7-8820-87EE93BC6374}" type="datetimeFigureOut">
               <a:rPr lang="es-CO" smtClean="0"/>
-              <a:t>21/10/2025</a:t>
+              <a:t>30/10/2025</a:t>
             </a:fld>
             <a:endParaRPr lang="es-CO"/>
           </a:p>
@@ -2915,7 +2915,7 @@
           <a:p>
             <a:fld id="{089BA713-8062-4EF7-8820-87EE93BC6374}" type="datetimeFigureOut">
               <a:rPr lang="es-CO" smtClean="0"/>
-              <a:t>21/10/2025</a:t>
+              <a:t>30/10/2025</a:t>
             </a:fld>
             <a:endParaRPr lang="es-CO"/>
           </a:p>
@@ -3041,7 +3041,7 @@
           <a:p>
             <a:fld id="{089BA713-8062-4EF7-8820-87EE93BC6374}" type="datetimeFigureOut">
               <a:rPr lang="es-CO" smtClean="0"/>
-              <a:t>21/10/2025</a:t>
+              <a:t>30/10/2025</a:t>
             </a:fld>
             <a:endParaRPr lang="es-CO"/>
           </a:p>
@@ -3292,7 +3292,7 @@
           <a:p>
             <a:fld id="{089BA713-8062-4EF7-8820-87EE93BC6374}" type="datetimeFigureOut">
               <a:rPr lang="es-CO" smtClean="0"/>
-              <a:t>21/10/2025</a:t>
+              <a:t>30/10/2025</a:t>
             </a:fld>
             <a:endParaRPr lang="es-CO"/>
           </a:p>
@@ -3737,7 +3737,7 @@
           <a:p>
             <a:fld id="{089BA713-8062-4EF7-8820-87EE93BC6374}" type="datetimeFigureOut">
               <a:rPr lang="es-CO" smtClean="0"/>
-              <a:t>21/10/2025</a:t>
+              <a:t>30/10/2025</a:t>
             </a:fld>
             <a:endParaRPr lang="es-CO"/>
           </a:p>
@@ -3904,6 +3904,13 @@
             <a:schemeClr val="lt1"/>
           </a:fontRef>
         </p:style>
+        <p:txBody>
+          <a:bodyPr/>
+          <a:lstStyle/>
+          <a:p>
+            <a:endParaRPr lang="es-MX"/>
+          </a:p>
+        </p:txBody>
       </p:sp>
       <p:pic>
         <p:nvPicPr>
@@ -4064,7 +4071,7 @@
           <a:p>
             <a:fld id="{089BA713-8062-4EF7-8820-87EE93BC6374}" type="datetimeFigureOut">
               <a:rPr lang="es-CO" smtClean="0"/>
-              <a:t>21/10/2025</a:t>
+              <a:t>30/10/2025</a:t>
             </a:fld>
             <a:endParaRPr lang="es-CO"/>
           </a:p>
@@ -4819,11 +4826,13 @@
           <a:p>
             <a:r>
               <a:rPr lang="es-ES" sz="1600" dirty="0"/>
-              <a:t>Isaac Amín </a:t>
-            </a:r>
+              <a:t>Isaac Amín Sofán Hernández</a:t>
+            </a:r>
+          </a:p>
+          <a:p>
             <a:r>
               <a:rPr lang="es-ES" sz="1600"/>
-              <a:t>Sofán Hernández</a:t>
+              <a:t>José Luis Córdoba Roldan</a:t>
             </a:r>
             <a:endParaRPr lang="es-ES" sz="1600" dirty="0"/>
           </a:p>

</xml_diff>